<commit_message>
Mod Karla, Abril, Juan.
</commit_message>
<xml_diff>
--- a/Presentación del proyecto.pptx
+++ b/Presentación del proyecto.pptx
@@ -7,23 +7,22 @@
   <p:sldIdLst>
     <p:sldId id="256" r:id="rId2"/>
     <p:sldId id="259" r:id="rId3"/>
-    <p:sldId id="260" r:id="rId4"/>
-    <p:sldId id="274" r:id="rId5"/>
-    <p:sldId id="261" r:id="rId6"/>
-    <p:sldId id="262" r:id="rId7"/>
-    <p:sldId id="275" r:id="rId8"/>
-    <p:sldId id="276" r:id="rId9"/>
-    <p:sldId id="273" r:id="rId10"/>
-    <p:sldId id="263" r:id="rId11"/>
-    <p:sldId id="265" r:id="rId12"/>
-    <p:sldId id="266" r:id="rId13"/>
-    <p:sldId id="267" r:id="rId14"/>
-    <p:sldId id="268" r:id="rId15"/>
-    <p:sldId id="269" r:id="rId16"/>
-    <p:sldId id="270" r:id="rId17"/>
-    <p:sldId id="271" r:id="rId18"/>
-    <p:sldId id="272" r:id="rId19"/>
-    <p:sldId id="257" r:id="rId20"/>
+    <p:sldId id="274" r:id="rId4"/>
+    <p:sldId id="261" r:id="rId5"/>
+    <p:sldId id="262" r:id="rId6"/>
+    <p:sldId id="275" r:id="rId7"/>
+    <p:sldId id="276" r:id="rId8"/>
+    <p:sldId id="273" r:id="rId9"/>
+    <p:sldId id="263" r:id="rId10"/>
+    <p:sldId id="265" r:id="rId11"/>
+    <p:sldId id="266" r:id="rId12"/>
+    <p:sldId id="267" r:id="rId13"/>
+    <p:sldId id="268" r:id="rId14"/>
+    <p:sldId id="269" r:id="rId15"/>
+    <p:sldId id="270" r:id="rId16"/>
+    <p:sldId id="271" r:id="rId17"/>
+    <p:sldId id="272" r:id="rId18"/>
+    <p:sldId id="257" r:id="rId19"/>
   </p:sldIdLst>
   <p:sldSz cx="12192000" cy="6858000"/>
   <p:notesSz cx="6858000" cy="9144000"/>
@@ -133,7 +132,6 @@
         <p14:section name="Introducción" id="{3284BDBD-3CCA-4EA8-869F-931366E71F40}">
           <p14:sldIdLst>
             <p14:sldId id="259"/>
-            <p14:sldId id="260"/>
           </p14:sldIdLst>
         </p14:section>
         <p14:section name="Extracción de datos" id="{162BD8B6-AEEC-4D13-935A-343896ACA966}">
@@ -146,7 +144,7 @@
             <p14:sldId id="273"/>
           </p14:sldIdLst>
         </p14:section>
-        <p14:section name="Preprocesamiento de datos" id="{97C6916A-E39A-45C8-9090-E3789E904FA0}">
+        <p14:section name="Preprocesamiento de datos Karla" id="{97C6916A-E39A-45C8-9090-E3789E904FA0}">
           <p14:sldIdLst>
             <p14:sldId id="263"/>
             <p14:sldId id="265"/>
@@ -155,7 +153,7 @@
             <p14:sldId id="268"/>
           </p14:sldIdLst>
         </p14:section>
-        <p14:section name="Descripción del modelo y prueba" id="{8C5CDE38-32CD-40EE-A6FC-D07F6B7DDA2B}">
+        <p14:section name="Descripción del modelo y prueba (Abril)" id="{8C5CDE38-32CD-40EE-A6FC-D07F6B7DDA2B}">
           <p14:sldIdLst>
             <p14:sldId id="269"/>
             <p14:sldId id="270"/>
@@ -3511,89 +3509,6 @@
           <p:cNvPr id="2" name="Title 1">
             <a:extLst>
               <a:ext uri="{FF2B5EF4-FFF2-40B4-BE49-F238E27FC236}">
-                <a16:creationId xmlns:a16="http://schemas.microsoft.com/office/drawing/2014/main" id="{0052B24A-D7F2-4D2B-B78F-F9F6CD1A447F}"/>
-              </a:ext>
-            </a:extLst>
-          </p:cNvPr>
-          <p:cNvSpPr>
-            <a:spLocks noGrp="1"/>
-          </p:cNvSpPr>
-          <p:nvPr>
-            <p:ph type="title"/>
-          </p:nvPr>
-        </p:nvSpPr>
-        <p:spPr/>
-        <p:txBody>
-          <a:bodyPr/>
-          <a:lstStyle/>
-          <a:p>
-            <a:r>
-              <a:rPr lang="es-MX" dirty="0"/>
-              <a:t>Preprocesado de datos</a:t>
-            </a:r>
-          </a:p>
-        </p:txBody>
-      </p:sp>
-      <p:sp>
-        <p:nvSpPr>
-          <p:cNvPr id="3" name="Content Placeholder 2">
-            <a:extLst>
-              <a:ext uri="{FF2B5EF4-FFF2-40B4-BE49-F238E27FC236}">
-                <a16:creationId xmlns:a16="http://schemas.microsoft.com/office/drawing/2014/main" id="{0DF705A0-8091-48A4-BD6D-B1E2344D2DCE}"/>
-              </a:ext>
-            </a:extLst>
-          </p:cNvPr>
-          <p:cNvSpPr>
-            <a:spLocks noGrp="1"/>
-          </p:cNvSpPr>
-          <p:nvPr>
-            <p:ph idx="1"/>
-          </p:nvPr>
-        </p:nvSpPr>
-        <p:spPr/>
-        <p:txBody>
-          <a:bodyPr/>
-          <a:lstStyle/>
-          <a:p>
-            <a:endParaRPr lang="es-MX"/>
-          </a:p>
-        </p:txBody>
-      </p:sp>
-    </p:spTree>
-    <p:extLst>
-      <p:ext uri="{BB962C8B-B14F-4D97-AF65-F5344CB8AC3E}">
-        <p14:creationId xmlns:p14="http://schemas.microsoft.com/office/powerpoint/2010/main" val="3619597841"/>
-      </p:ext>
-    </p:extLst>
-  </p:cSld>
-  <p:clrMapOvr>
-    <a:masterClrMapping/>
-  </p:clrMapOvr>
-</p:sld>
-</file>
-
-<file path=ppt/slides/slide11.xml><?xml version="1.0" encoding="utf-8"?>
-<p:sld xmlns:a="http://schemas.openxmlformats.org/drawingml/2006/main" xmlns:r="http://schemas.openxmlformats.org/officeDocument/2006/relationships" xmlns:p="http://schemas.openxmlformats.org/presentationml/2006/main">
-  <p:cSld>
-    <p:spTree>
-      <p:nvGrpSpPr>
-        <p:cNvPr id="1" name=""/>
-        <p:cNvGrpSpPr/>
-        <p:nvPr/>
-      </p:nvGrpSpPr>
-      <p:grpSpPr>
-        <a:xfrm>
-          <a:off x="0" y="0"/>
-          <a:ext cx="0" cy="0"/>
-          <a:chOff x="0" y="0"/>
-          <a:chExt cx="0" cy="0"/>
-        </a:xfrm>
-      </p:grpSpPr>
-      <p:sp>
-        <p:nvSpPr>
-          <p:cNvPr id="2" name="Title 1">
-            <a:extLst>
-              <a:ext uri="{FF2B5EF4-FFF2-40B4-BE49-F238E27FC236}">
                 <a16:creationId xmlns:a16="http://schemas.microsoft.com/office/drawing/2014/main" id="{5EBA71E9-9841-4CC6-8EC9-75AD5D1DD483}"/>
               </a:ext>
             </a:extLst>
@@ -3655,7 +3570,7 @@
 </p:sld>
 </file>
 
-<file path=ppt/slides/slide12.xml><?xml version="1.0" encoding="utf-8"?>
+<file path=ppt/slides/slide11.xml><?xml version="1.0" encoding="utf-8"?>
 <p:sld xmlns:a="http://schemas.openxmlformats.org/drawingml/2006/main" xmlns:r="http://schemas.openxmlformats.org/officeDocument/2006/relationships" xmlns:p="http://schemas.openxmlformats.org/presentationml/2006/main">
   <p:cSld>
     <p:spTree>
@@ -3738,7 +3653,7 @@
 </p:sld>
 </file>
 
-<file path=ppt/slides/slide13.xml><?xml version="1.0" encoding="utf-8"?>
+<file path=ppt/slides/slide12.xml><?xml version="1.0" encoding="utf-8"?>
 <p:sld xmlns:a="http://schemas.openxmlformats.org/drawingml/2006/main" xmlns:r="http://schemas.openxmlformats.org/officeDocument/2006/relationships" xmlns:p="http://schemas.openxmlformats.org/presentationml/2006/main">
   <p:cSld>
     <p:spTree>
@@ -3825,7 +3740,7 @@
 </p:sld>
 </file>
 
-<file path=ppt/slides/slide14.xml><?xml version="1.0" encoding="utf-8"?>
+<file path=ppt/slides/slide13.xml><?xml version="1.0" encoding="utf-8"?>
 <p:sld xmlns:a="http://schemas.openxmlformats.org/drawingml/2006/main" xmlns:r="http://schemas.openxmlformats.org/officeDocument/2006/relationships" xmlns:p="http://schemas.openxmlformats.org/presentationml/2006/main">
   <p:cSld>
     <p:spTree>
@@ -3938,7 +3853,7 @@
 </p:sld>
 </file>
 
-<file path=ppt/slides/slide15.xml><?xml version="1.0" encoding="utf-8"?>
+<file path=ppt/slides/slide14.xml><?xml version="1.0" encoding="utf-8"?>
 <p:sld xmlns:a="http://schemas.openxmlformats.org/drawingml/2006/main" xmlns:r="http://schemas.openxmlformats.org/officeDocument/2006/relationships" xmlns:p="http://schemas.openxmlformats.org/presentationml/2006/main">
   <p:cSld>
     <p:spTree>
@@ -3983,8 +3898,8 @@
           </a:p>
         </p:txBody>
       </p:sp>
-      <mc:AlternateContent xmlns:mc="http://schemas.openxmlformats.org/markup-compatibility/2006">
-        <mc:Choice xmlns:a14="http://schemas.microsoft.com/office/drawing/2010/main" Requires="a14">
+      <mc:AlternateContent xmlns:mc="http://schemas.openxmlformats.org/markup-compatibility/2006" xmlns:a14="http://schemas.microsoft.com/office/drawing/2010/main">
+        <mc:Choice Requires="a14">
           <p:sp>
             <p:nvSpPr>
               <p:cNvPr id="3" name="Content Placeholder 2">
@@ -4572,7 +4487,7 @@
             </p:txBody>
           </p:sp>
         </mc:Choice>
-        <mc:Fallback>
+        <mc:Fallback xmlns="">
           <p:sp>
             <p:nvSpPr>
               <p:cNvPr id="3" name="Content Placeholder 2">
@@ -4625,7 +4540,7 @@
 </p:sld>
 </file>
 
-<file path=ppt/slides/slide16.xml><?xml version="1.0" encoding="utf-8"?>
+<file path=ppt/slides/slide15.xml><?xml version="1.0" encoding="utf-8"?>
 <p:sld xmlns:a="http://schemas.openxmlformats.org/drawingml/2006/main" xmlns:r="http://schemas.openxmlformats.org/officeDocument/2006/relationships" xmlns:p="http://schemas.openxmlformats.org/presentationml/2006/main">
   <p:cSld>
     <p:spTree>
@@ -4708,7 +4623,7 @@
 </p:sld>
 </file>
 
-<file path=ppt/slides/slide17.xml><?xml version="1.0" encoding="utf-8"?>
+<file path=ppt/slides/slide16.xml><?xml version="1.0" encoding="utf-8"?>
 <p:sld xmlns:a="http://schemas.openxmlformats.org/drawingml/2006/main" xmlns:r="http://schemas.openxmlformats.org/officeDocument/2006/relationships" xmlns:p="http://schemas.openxmlformats.org/presentationml/2006/main">
   <p:cSld>
     <p:spTree>
@@ -4791,7 +4706,7 @@
 </p:sld>
 </file>
 
-<file path=ppt/slides/slide18.xml><?xml version="1.0" encoding="utf-8"?>
+<file path=ppt/slides/slide17.xml><?xml version="1.0" encoding="utf-8"?>
 <p:sld xmlns:a="http://schemas.openxmlformats.org/drawingml/2006/main" xmlns:r="http://schemas.openxmlformats.org/officeDocument/2006/relationships" xmlns:p="http://schemas.openxmlformats.org/presentationml/2006/main">
   <p:cSld>
     <p:spTree>
@@ -4874,7 +4789,7 @@
 </p:sld>
 </file>
 
-<file path=ppt/slides/slide19.xml><?xml version="1.0" encoding="utf-8"?>
+<file path=ppt/slides/slide18.xml><?xml version="1.0" encoding="utf-8"?>
 <p:sld xmlns:a="http://schemas.openxmlformats.org/drawingml/2006/main" xmlns:r="http://schemas.openxmlformats.org/officeDocument/2006/relationships" xmlns:p="http://schemas.openxmlformats.org/presentationml/2006/main">
   <p:cSld>
     <p:spTree>
@@ -5392,89 +5307,6 @@
           <p:cNvPr id="2" name="Title 1">
             <a:extLst>
               <a:ext uri="{FF2B5EF4-FFF2-40B4-BE49-F238E27FC236}">
-                <a16:creationId xmlns:a16="http://schemas.microsoft.com/office/drawing/2014/main" id="{5531DB58-6009-4C3B-A9CD-4D7C547A487E}"/>
-              </a:ext>
-            </a:extLst>
-          </p:cNvPr>
-          <p:cNvSpPr>
-            <a:spLocks noGrp="1"/>
-          </p:cNvSpPr>
-          <p:nvPr>
-            <p:ph type="title"/>
-          </p:nvPr>
-        </p:nvSpPr>
-        <p:spPr/>
-        <p:txBody>
-          <a:bodyPr/>
-          <a:lstStyle/>
-          <a:p>
-            <a:r>
-              <a:rPr lang="es-MX" dirty="0"/>
-              <a:t>Descripción del conjunto de datos</a:t>
-            </a:r>
-          </a:p>
-        </p:txBody>
-      </p:sp>
-      <p:sp>
-        <p:nvSpPr>
-          <p:cNvPr id="3" name="Content Placeholder 2">
-            <a:extLst>
-              <a:ext uri="{FF2B5EF4-FFF2-40B4-BE49-F238E27FC236}">
-                <a16:creationId xmlns:a16="http://schemas.microsoft.com/office/drawing/2014/main" id="{6ADC2516-1A04-412E-ACF6-3277C4C5F573}"/>
-              </a:ext>
-            </a:extLst>
-          </p:cNvPr>
-          <p:cNvSpPr>
-            <a:spLocks noGrp="1"/>
-          </p:cNvSpPr>
-          <p:nvPr>
-            <p:ph idx="1"/>
-          </p:nvPr>
-        </p:nvSpPr>
-        <p:spPr/>
-        <p:txBody>
-          <a:bodyPr/>
-          <a:lstStyle/>
-          <a:p>
-            <a:endParaRPr lang="es-MX"/>
-          </a:p>
-        </p:txBody>
-      </p:sp>
-    </p:spTree>
-    <p:extLst>
-      <p:ext uri="{BB962C8B-B14F-4D97-AF65-F5344CB8AC3E}">
-        <p14:creationId xmlns:p14="http://schemas.microsoft.com/office/powerpoint/2010/main" val="954012741"/>
-      </p:ext>
-    </p:extLst>
-  </p:cSld>
-  <p:clrMapOvr>
-    <a:masterClrMapping/>
-  </p:clrMapOvr>
-</p:sld>
-</file>
-
-<file path=ppt/slides/slide4.xml><?xml version="1.0" encoding="utf-8"?>
-<p:sld xmlns:a="http://schemas.openxmlformats.org/drawingml/2006/main" xmlns:r="http://schemas.openxmlformats.org/officeDocument/2006/relationships" xmlns:p="http://schemas.openxmlformats.org/presentationml/2006/main">
-  <p:cSld>
-    <p:spTree>
-      <p:nvGrpSpPr>
-        <p:cNvPr id="1" name=""/>
-        <p:cNvGrpSpPr/>
-        <p:nvPr/>
-      </p:nvGrpSpPr>
-      <p:grpSpPr>
-        <a:xfrm>
-          <a:off x="0" y="0"/>
-          <a:ext cx="0" cy="0"/>
-          <a:chOff x="0" y="0"/>
-          <a:chExt cx="0" cy="0"/>
-        </a:xfrm>
-      </p:grpSpPr>
-      <p:sp>
-        <p:nvSpPr>
-          <p:cNvPr id="2" name="Title 1">
-            <a:extLst>
-              <a:ext uri="{FF2B5EF4-FFF2-40B4-BE49-F238E27FC236}">
                 <a16:creationId xmlns:a16="http://schemas.microsoft.com/office/drawing/2014/main" id="{EB4C38EE-FDD3-43E1-80DF-50B8EFA8A373}"/>
               </a:ext>
             </a:extLst>
@@ -5519,10 +5351,43 @@
           <a:bodyPr/>
           <a:lstStyle/>
           <a:p>
-            <a:endParaRPr lang="es-MX"/>
+            <a:r>
+              <a:rPr lang="es-MX" dirty="0"/>
+              <a:t>Se extrajo del sitio web bla…..</a:t>
+            </a:r>
           </a:p>
         </p:txBody>
       </p:sp>
+      <p:pic>
+        <p:nvPicPr>
+          <p:cNvPr id="7" name="Picture 6">
+            <a:extLst>
+              <a:ext uri="{FF2B5EF4-FFF2-40B4-BE49-F238E27FC236}">
+                <a16:creationId xmlns:a16="http://schemas.microsoft.com/office/drawing/2014/main" id="{7678B06B-F052-4D05-8065-D36DEFACACF4}"/>
+              </a:ext>
+            </a:extLst>
+          </p:cNvPr>
+          <p:cNvPicPr>
+            <a:picLocks noChangeAspect="1"/>
+          </p:cNvPicPr>
+          <p:nvPr/>
+        </p:nvPicPr>
+        <p:blipFill>
+          <a:blip r:embed="rId2"/>
+          <a:stretch>
+            <a:fillRect/>
+          </a:stretch>
+        </p:blipFill>
+        <p:spPr>
+          <a:xfrm>
+            <a:off x="3794715" y="1671263"/>
+            <a:ext cx="7696832" cy="5186737"/>
+          </a:xfrm>
+          <a:prstGeom prst="rect">
+            <a:avLst/>
+          </a:prstGeom>
+        </p:spPr>
+      </p:pic>
     </p:spTree>
     <p:extLst>
       <p:ext uri="{BB962C8B-B14F-4D97-AF65-F5344CB8AC3E}">
@@ -5536,7 +5401,7 @@
 </p:sld>
 </file>
 
-<file path=ppt/slides/slide5.xml><?xml version="1.0" encoding="utf-8"?>
+<file path=ppt/slides/slide4.xml><?xml version="1.0" encoding="utf-8"?>
 <p:sld xmlns:a="http://schemas.openxmlformats.org/drawingml/2006/main" xmlns:r="http://schemas.openxmlformats.org/officeDocument/2006/relationships" xmlns:p="http://schemas.openxmlformats.org/presentationml/2006/main">
   <p:cSld>
     <p:spTree>
@@ -5795,7 +5660,7 @@
                             <a:schemeClr val="tx1"/>
                           </a:solidFill>
                           <a:effectLst/>
-                          <a:hlinkClick r:id="rId3">
+                          <a:hlinkClick r:id="rId2">
                             <a:extLst>
                               <a:ext uri="{A12FA001-AC4F-418D-AE19-62706E023703}">
                                 <ahyp:hlinkClr xmlns:ahyp="http://schemas.microsoft.com/office/drawing/2018/hyperlinkcolor" val="tx"/>
@@ -5841,8 +5706,8 @@
         </p:nvSpPr>
         <p:spPr>
           <a:xfrm>
-            <a:off x="6899564" y="1853724"/>
-            <a:ext cx="4558869" cy="4288353"/>
+            <a:off x="6553920" y="1449278"/>
+            <a:ext cx="4558869" cy="4950073"/>
           </a:xfrm>
           <a:prstGeom prst="rect">
             <a:avLst/>
@@ -5873,7 +5738,7 @@
               </a:spcAft>
             </a:pPr>
             <a:r>
-              <a:rPr lang="es-MX" sz="600" dirty="0">
+              <a:rPr lang="es-MX" sz="700" dirty="0">
                 <a:solidFill>
                   <a:srgbClr val="000000"/>
                 </a:solidFill>
@@ -5885,7 +5750,7 @@
               <a:t>{'</a:t>
             </a:r>
             <a:r>
-              <a:rPr lang="es-MX" sz="600" dirty="0" err="1">
+              <a:rPr lang="es-MX" sz="700" dirty="0" err="1">
                 <a:solidFill>
                   <a:srgbClr val="000000"/>
                 </a:solidFill>
@@ -5897,7 +5762,7 @@
               <a:t>adult</a:t>
             </a:r>
             <a:r>
-              <a:rPr lang="es-MX" sz="600" dirty="0">
+              <a:rPr lang="es-MX" sz="700" dirty="0">
                 <a:solidFill>
                   <a:srgbClr val="000000"/>
                 </a:solidFill>
@@ -5908,7 +5773,7 @@
               </a:rPr>
               <a:t>': False,</a:t>
             </a:r>
-            <a:endParaRPr lang="es-MX" sz="600" dirty="0">
+            <a:endParaRPr lang="es-MX" sz="700" dirty="0">
               <a:effectLst/>
               <a:latin typeface="Consolas" panose="020B0609020204030204" pitchFamily="49" charset="0"/>
               <a:ea typeface="Calibri" panose="020F0502020204030204" pitchFamily="34" charset="0"/>
@@ -5925,7 +5790,7 @@
               </a:spcAft>
             </a:pPr>
             <a:r>
-              <a:rPr lang="es-MX" sz="600" dirty="0">
+              <a:rPr lang="es-MX" sz="700" dirty="0">
                 <a:solidFill>
                   <a:srgbClr val="000000"/>
                 </a:solidFill>
@@ -5937,7 +5802,7 @@
               <a:t> '</a:t>
             </a:r>
             <a:r>
-              <a:rPr lang="es-MX" sz="600" dirty="0" err="1">
+              <a:rPr lang="es-MX" sz="700" dirty="0" err="1">
                 <a:solidFill>
                   <a:srgbClr val="000000"/>
                 </a:solidFill>
@@ -5949,7 +5814,7 @@
               <a:t>backdrop_path</a:t>
             </a:r>
             <a:r>
-              <a:rPr lang="es-MX" sz="600" dirty="0">
+              <a:rPr lang="es-MX" sz="700" dirty="0">
                 <a:solidFill>
                   <a:srgbClr val="000000"/>
                 </a:solidFill>
@@ -5960,7 +5825,7 @@
               </a:rPr>
               <a:t>': '/kZyurQjTMLHalUxs7sHgH5XeiwO.jpg',</a:t>
             </a:r>
-            <a:endParaRPr lang="es-MX" sz="600" dirty="0">
+            <a:endParaRPr lang="es-MX" sz="700" dirty="0">
               <a:effectLst/>
               <a:latin typeface="Consolas" panose="020B0609020204030204" pitchFamily="49" charset="0"/>
               <a:ea typeface="Calibri" panose="020F0502020204030204" pitchFamily="34" charset="0"/>
@@ -5977,7 +5842,7 @@
               </a:spcAft>
             </a:pPr>
             <a:r>
-              <a:rPr lang="es-MX" sz="600" dirty="0">
+              <a:rPr lang="es-MX" sz="700" dirty="0">
                 <a:solidFill>
                   <a:srgbClr val="000000"/>
                 </a:solidFill>
@@ -5989,7 +5854,7 @@
               <a:t> </a:t>
             </a:r>
             <a:r>
-              <a:rPr lang="en-US" sz="600" dirty="0">
+              <a:rPr lang="en-US" sz="700" dirty="0">
                 <a:solidFill>
                   <a:srgbClr val="000000"/>
                 </a:solidFill>
@@ -6001,7 +5866,7 @@
               <a:t>'</a:t>
             </a:r>
             <a:r>
-              <a:rPr lang="en-US" sz="600" dirty="0" err="1">
+              <a:rPr lang="en-US" sz="700" dirty="0" err="1">
                 <a:solidFill>
                   <a:srgbClr val="000000"/>
                 </a:solidFill>
@@ -6013,7 +5878,7 @@
               <a:t>belongs_to_collection</a:t>
             </a:r>
             <a:r>
-              <a:rPr lang="en-US" sz="600" dirty="0">
+              <a:rPr lang="en-US" sz="700" dirty="0">
                 <a:solidFill>
                   <a:srgbClr val="000000"/>
                 </a:solidFill>
@@ -6024,7 +5889,7 @@
               </a:rPr>
               <a:t>': None,</a:t>
             </a:r>
-            <a:endParaRPr lang="es-MX" sz="600" dirty="0">
+            <a:endParaRPr lang="es-MX" sz="700" dirty="0">
               <a:effectLst/>
               <a:latin typeface="Consolas" panose="020B0609020204030204" pitchFamily="49" charset="0"/>
               <a:ea typeface="Calibri" panose="020F0502020204030204" pitchFamily="34" charset="0"/>
@@ -6041,7 +5906,7 @@
               </a:spcAft>
             </a:pPr>
             <a:r>
-              <a:rPr lang="en-US" sz="600" dirty="0">
+              <a:rPr lang="en-US" sz="700" dirty="0">
                 <a:solidFill>
                   <a:srgbClr val="000000"/>
                 </a:solidFill>
@@ -6052,7 +5917,7 @@
               </a:rPr>
               <a:t> 'budget': 2500000,</a:t>
             </a:r>
-            <a:endParaRPr lang="es-MX" sz="600" dirty="0">
+            <a:endParaRPr lang="es-MX" sz="700" dirty="0">
               <a:effectLst/>
               <a:latin typeface="Consolas" panose="020B0609020204030204" pitchFamily="49" charset="0"/>
               <a:ea typeface="Calibri" panose="020F0502020204030204" pitchFamily="34" charset="0"/>
@@ -6069,7 +5934,7 @@
               </a:spcAft>
             </a:pPr>
             <a:r>
-              <a:rPr lang="en-US" sz="600" dirty="0">
+              <a:rPr lang="en-US" sz="700" dirty="0">
                 <a:solidFill>
                   <a:srgbClr val="000000"/>
                 </a:solidFill>
@@ -6080,7 +5945,7 @@
               </a:rPr>
               <a:t> 'genres': [{'id': 18, 'name': 'Drama'}, {'id': 10749, 'name': 'Romance'}],</a:t>
             </a:r>
-            <a:endParaRPr lang="es-MX" sz="600" dirty="0">
+            <a:endParaRPr lang="es-MX" sz="700" dirty="0">
               <a:effectLst/>
               <a:latin typeface="Consolas" panose="020B0609020204030204" pitchFamily="49" charset="0"/>
               <a:ea typeface="Calibri" panose="020F0502020204030204" pitchFamily="34" charset="0"/>
@@ -6097,7 +5962,7 @@
               </a:spcAft>
             </a:pPr>
             <a:r>
-              <a:rPr lang="en-US" sz="600" dirty="0">
+              <a:rPr lang="en-US" sz="700" dirty="0">
                 <a:solidFill>
                   <a:srgbClr val="000000"/>
                 </a:solidFill>
@@ -6108,7 +5973,7 @@
               </a:rPr>
               <a:t> 'homepage': 'http://www.clubcultura.com/clubcine/clubcineastas/isabelcoixet/mividasinmi/index.htm',</a:t>
             </a:r>
-            <a:endParaRPr lang="es-MX" sz="600" dirty="0">
+            <a:endParaRPr lang="es-MX" sz="700" dirty="0">
               <a:effectLst/>
               <a:latin typeface="Consolas" panose="020B0609020204030204" pitchFamily="49" charset="0"/>
               <a:ea typeface="Calibri" panose="020F0502020204030204" pitchFamily="34" charset="0"/>
@@ -6125,7 +5990,7 @@
               </a:spcAft>
             </a:pPr>
             <a:r>
-              <a:rPr lang="en-US" sz="600" dirty="0">
+              <a:rPr lang="en-US" sz="700" dirty="0">
                 <a:solidFill>
                   <a:srgbClr val="000000"/>
                 </a:solidFill>
@@ -6136,7 +6001,7 @@
               </a:rPr>
               <a:t> 'id': 20,</a:t>
             </a:r>
-            <a:endParaRPr lang="es-MX" sz="600" dirty="0">
+            <a:endParaRPr lang="es-MX" sz="700" dirty="0">
               <a:effectLst/>
               <a:latin typeface="Consolas" panose="020B0609020204030204" pitchFamily="49" charset="0"/>
               <a:ea typeface="Calibri" panose="020F0502020204030204" pitchFamily="34" charset="0"/>
@@ -6153,7 +6018,7 @@
               </a:spcAft>
             </a:pPr>
             <a:r>
-              <a:rPr lang="en-US" sz="600" dirty="0">
+              <a:rPr lang="en-US" sz="700" dirty="0">
                 <a:solidFill>
                   <a:srgbClr val="000000"/>
                 </a:solidFill>
@@ -6165,7 +6030,7 @@
               <a:t> '</a:t>
             </a:r>
             <a:r>
-              <a:rPr lang="en-US" sz="600" dirty="0" err="1">
+              <a:rPr lang="en-US" sz="700" dirty="0" err="1">
                 <a:solidFill>
                   <a:srgbClr val="000000"/>
                 </a:solidFill>
@@ -6177,7 +6042,7 @@
               <a:t>imdb_id</a:t>
             </a:r>
             <a:r>
-              <a:rPr lang="en-US" sz="600" dirty="0">
+              <a:rPr lang="en-US" sz="700" dirty="0">
                 <a:solidFill>
                   <a:srgbClr val="000000"/>
                 </a:solidFill>
@@ -6188,7 +6053,7 @@
               </a:rPr>
               <a:t>': 'tt0314412',</a:t>
             </a:r>
-            <a:endParaRPr lang="es-MX" sz="600" dirty="0">
+            <a:endParaRPr lang="es-MX" sz="700" dirty="0">
               <a:effectLst/>
               <a:latin typeface="Consolas" panose="020B0609020204030204" pitchFamily="49" charset="0"/>
               <a:ea typeface="Calibri" panose="020F0502020204030204" pitchFamily="34" charset="0"/>
@@ -6205,7 +6070,7 @@
               </a:spcAft>
             </a:pPr>
             <a:r>
-              <a:rPr lang="en-US" sz="600" dirty="0">
+              <a:rPr lang="en-US" sz="700" dirty="0">
                 <a:solidFill>
                   <a:srgbClr val="000000"/>
                 </a:solidFill>
@@ -6217,7 +6082,7 @@
               <a:t> '</a:t>
             </a:r>
             <a:r>
-              <a:rPr lang="en-US" sz="600" dirty="0" err="1">
+              <a:rPr lang="en-US" sz="700" dirty="0" err="1">
                 <a:solidFill>
                   <a:srgbClr val="000000"/>
                 </a:solidFill>
@@ -6229,7 +6094,7 @@
               <a:t>original_language</a:t>
             </a:r>
             <a:r>
-              <a:rPr lang="en-US" sz="600" dirty="0">
+              <a:rPr lang="en-US" sz="700" dirty="0">
                 <a:solidFill>
                   <a:srgbClr val="000000"/>
                 </a:solidFill>
@@ -6241,7 +6106,7 @@
               <a:t>': '</a:t>
             </a:r>
             <a:r>
-              <a:rPr lang="en-US" sz="600" dirty="0" err="1">
+              <a:rPr lang="en-US" sz="700" dirty="0" err="1">
                 <a:solidFill>
                   <a:srgbClr val="000000"/>
                 </a:solidFill>
@@ -6253,7 +6118,7 @@
               <a:t>en</a:t>
             </a:r>
             <a:r>
-              <a:rPr lang="en-US" sz="600" dirty="0">
+              <a:rPr lang="en-US" sz="700" dirty="0">
                 <a:solidFill>
                   <a:srgbClr val="000000"/>
                 </a:solidFill>
@@ -6264,7 +6129,7 @@
               </a:rPr>
               <a:t>',</a:t>
             </a:r>
-            <a:endParaRPr lang="es-MX" sz="600" dirty="0">
+            <a:endParaRPr lang="es-MX" sz="700" dirty="0">
               <a:effectLst/>
               <a:latin typeface="Consolas" panose="020B0609020204030204" pitchFamily="49" charset="0"/>
               <a:ea typeface="Calibri" panose="020F0502020204030204" pitchFamily="34" charset="0"/>
@@ -6281,7 +6146,7 @@
               </a:spcAft>
             </a:pPr>
             <a:r>
-              <a:rPr lang="en-US" sz="600" dirty="0">
+              <a:rPr lang="en-US" sz="700" dirty="0">
                 <a:solidFill>
                   <a:srgbClr val="000000"/>
                 </a:solidFill>
@@ -6293,7 +6158,7 @@
               <a:t> '</a:t>
             </a:r>
             <a:r>
-              <a:rPr lang="en-US" sz="600" dirty="0" err="1">
+              <a:rPr lang="en-US" sz="700" dirty="0" err="1">
                 <a:solidFill>
                   <a:srgbClr val="000000"/>
                 </a:solidFill>
@@ -6305,7 +6170,7 @@
               <a:t>original_title</a:t>
             </a:r>
             <a:r>
-              <a:rPr lang="en-US" sz="600" dirty="0">
+              <a:rPr lang="en-US" sz="700" dirty="0">
                 <a:solidFill>
                   <a:srgbClr val="000000"/>
                 </a:solidFill>
@@ -6316,7 +6181,7 @@
               </a:rPr>
               <a:t>': 'My Life Without Me',</a:t>
             </a:r>
-            <a:endParaRPr lang="es-MX" sz="600" dirty="0">
+            <a:endParaRPr lang="es-MX" sz="700" dirty="0">
               <a:effectLst/>
               <a:latin typeface="Consolas" panose="020B0609020204030204" pitchFamily="49" charset="0"/>
               <a:ea typeface="Calibri" panose="020F0502020204030204" pitchFamily="34" charset="0"/>
@@ -6333,7 +6198,7 @@
               </a:spcAft>
             </a:pPr>
             <a:r>
-              <a:rPr lang="en-US" sz="600" dirty="0">
+              <a:rPr lang="en-US" sz="700" dirty="0">
                 <a:solidFill>
                   <a:srgbClr val="000000"/>
                 </a:solidFill>
@@ -6344,7 +6209,7 @@
               </a:rPr>
               <a:t> 'overview': 'A fatally ill mother with only two months to live creates a list of things she wants to do before she dies without telling her family of her illness.',</a:t>
             </a:r>
-            <a:endParaRPr lang="es-MX" sz="600" dirty="0">
+            <a:endParaRPr lang="es-MX" sz="700" dirty="0">
               <a:effectLst/>
               <a:latin typeface="Consolas" panose="020B0609020204030204" pitchFamily="49" charset="0"/>
               <a:ea typeface="Calibri" panose="020F0502020204030204" pitchFamily="34" charset="0"/>
@@ -6361,7 +6226,7 @@
               </a:spcAft>
             </a:pPr>
             <a:r>
-              <a:rPr lang="en-US" sz="600" dirty="0">
+              <a:rPr lang="en-US" sz="700" dirty="0">
                 <a:solidFill>
                   <a:srgbClr val="000000"/>
                 </a:solidFill>
@@ -6372,7 +6237,7 @@
               </a:rPr>
               <a:t> 'popularity': 13.863,</a:t>
             </a:r>
-            <a:endParaRPr lang="es-MX" sz="600" dirty="0">
+            <a:endParaRPr lang="es-MX" sz="700" dirty="0">
               <a:effectLst/>
               <a:latin typeface="Consolas" panose="020B0609020204030204" pitchFamily="49" charset="0"/>
               <a:ea typeface="Calibri" panose="020F0502020204030204" pitchFamily="34" charset="0"/>
@@ -6389,7 +6254,7 @@
               </a:spcAft>
             </a:pPr>
             <a:r>
-              <a:rPr lang="en-US" sz="600" dirty="0">
+              <a:rPr lang="en-US" sz="700" dirty="0">
                 <a:solidFill>
                   <a:srgbClr val="000000"/>
                 </a:solidFill>
@@ -6401,7 +6266,7 @@
               <a:t> '</a:t>
             </a:r>
             <a:r>
-              <a:rPr lang="en-US" sz="600" dirty="0" err="1">
+              <a:rPr lang="en-US" sz="700" dirty="0" err="1">
                 <a:solidFill>
                   <a:srgbClr val="000000"/>
                 </a:solidFill>
@@ -6413,7 +6278,7 @@
               <a:t>poster_path</a:t>
             </a:r>
             <a:r>
-              <a:rPr lang="en-US" sz="600" dirty="0">
+              <a:rPr lang="en-US" sz="700" dirty="0">
                 <a:solidFill>
                   <a:srgbClr val="000000"/>
                 </a:solidFill>
@@ -6424,7 +6289,7 @@
               </a:rPr>
               <a:t>': '/9Fa7tCEKIha1llGH7E41mxSpaF6.jpg',</a:t>
             </a:r>
-            <a:endParaRPr lang="es-MX" sz="600" dirty="0">
+            <a:endParaRPr lang="es-MX" sz="700" dirty="0">
               <a:effectLst/>
               <a:latin typeface="Consolas" panose="020B0609020204030204" pitchFamily="49" charset="0"/>
               <a:ea typeface="Calibri" panose="020F0502020204030204" pitchFamily="34" charset="0"/>
@@ -6441,7 +6306,7 @@
               </a:spcAft>
             </a:pPr>
             <a:r>
-              <a:rPr lang="en-US" sz="600" dirty="0">
+              <a:rPr lang="en-US" sz="700" dirty="0">
                 <a:solidFill>
                   <a:srgbClr val="000000"/>
                 </a:solidFill>
@@ -6453,7 +6318,7 @@
               <a:t> '</a:t>
             </a:r>
             <a:r>
-              <a:rPr lang="en-US" sz="600" dirty="0" err="1">
+              <a:rPr lang="en-US" sz="700" dirty="0" err="1">
                 <a:solidFill>
                   <a:srgbClr val="000000"/>
                 </a:solidFill>
@@ -6465,7 +6330,7 @@
               <a:t>production_companies</a:t>
             </a:r>
             <a:r>
-              <a:rPr lang="en-US" sz="600" dirty="0">
+              <a:rPr lang="en-US" sz="700" dirty="0">
                 <a:solidFill>
                   <a:srgbClr val="000000"/>
                 </a:solidFill>
@@ -6476,7 +6341,7 @@
               </a:rPr>
               <a:t>': [{'id': 49,</a:t>
             </a:r>
-            <a:endParaRPr lang="es-MX" sz="600" dirty="0">
+            <a:endParaRPr lang="es-MX" sz="700" dirty="0">
               <a:effectLst/>
               <a:latin typeface="Consolas" panose="020B0609020204030204" pitchFamily="49" charset="0"/>
               <a:ea typeface="Calibri" panose="020F0502020204030204" pitchFamily="34" charset="0"/>
@@ -6493,7 +6358,7 @@
               </a:spcAft>
             </a:pPr>
             <a:r>
-              <a:rPr lang="en-US" sz="600" dirty="0">
+              <a:rPr lang="en-US" sz="700" dirty="0">
                 <a:solidFill>
                   <a:srgbClr val="000000"/>
                 </a:solidFill>
@@ -6505,7 +6370,7 @@
               <a:t>   '</a:t>
             </a:r>
             <a:r>
-              <a:rPr lang="en-US" sz="600" dirty="0" err="1">
+              <a:rPr lang="en-US" sz="700" dirty="0" err="1">
                 <a:solidFill>
                   <a:srgbClr val="000000"/>
                 </a:solidFill>
@@ -6517,7 +6382,7 @@
               <a:t>logo_path</a:t>
             </a:r>
             <a:r>
-              <a:rPr lang="en-US" sz="600" dirty="0">
+              <a:rPr lang="en-US" sz="700" dirty="0">
                 <a:solidFill>
                   <a:srgbClr val="000000"/>
                 </a:solidFill>
@@ -6528,7 +6393,7 @@
               </a:rPr>
               <a:t>': '/xpf5iHdvvBtsH8jBMlgIJHAET0c.png',</a:t>
             </a:r>
-            <a:endParaRPr lang="es-MX" sz="600" dirty="0">
+            <a:endParaRPr lang="es-MX" sz="700" dirty="0">
               <a:effectLst/>
               <a:latin typeface="Consolas" panose="020B0609020204030204" pitchFamily="49" charset="0"/>
               <a:ea typeface="Calibri" panose="020F0502020204030204" pitchFamily="34" charset="0"/>
@@ -6545,7 +6410,7 @@
               </a:spcAft>
             </a:pPr>
             <a:r>
-              <a:rPr lang="en-US" sz="600" dirty="0">
+              <a:rPr lang="en-US" sz="700" dirty="0">
                 <a:solidFill>
                   <a:srgbClr val="000000"/>
                 </a:solidFill>
@@ -6557,7 +6422,7 @@
               <a:t>   'name': 'El </a:t>
             </a:r>
             <a:r>
-              <a:rPr lang="en-US" sz="600" dirty="0" err="1">
+              <a:rPr lang="en-US" sz="700" dirty="0" err="1">
                 <a:solidFill>
                   <a:srgbClr val="000000"/>
                 </a:solidFill>
@@ -6569,7 +6434,7 @@
               <a:t>Deseo</a:t>
             </a:r>
             <a:r>
-              <a:rPr lang="en-US" sz="600" dirty="0">
+              <a:rPr lang="en-US" sz="700" dirty="0">
                 <a:solidFill>
                   <a:srgbClr val="000000"/>
                 </a:solidFill>
@@ -6580,7 +6445,7 @@
               </a:rPr>
               <a:t>',</a:t>
             </a:r>
-            <a:endParaRPr lang="es-MX" sz="600" dirty="0">
+            <a:endParaRPr lang="es-MX" sz="700" dirty="0">
               <a:effectLst/>
               <a:latin typeface="Consolas" panose="020B0609020204030204" pitchFamily="49" charset="0"/>
               <a:ea typeface="Calibri" panose="020F0502020204030204" pitchFamily="34" charset="0"/>
@@ -6597,7 +6462,7 @@
               </a:spcAft>
             </a:pPr>
             <a:r>
-              <a:rPr lang="en-US" sz="600" dirty="0">
+              <a:rPr lang="en-US" sz="700" dirty="0">
                 <a:solidFill>
                   <a:srgbClr val="000000"/>
                 </a:solidFill>
@@ -6609,7 +6474,7 @@
               <a:t>   '</a:t>
             </a:r>
             <a:r>
-              <a:rPr lang="en-US" sz="600" dirty="0" err="1">
+              <a:rPr lang="en-US" sz="700" dirty="0" err="1">
                 <a:solidFill>
                   <a:srgbClr val="000000"/>
                 </a:solidFill>
@@ -6621,7 +6486,7 @@
               <a:t>origin_country</a:t>
             </a:r>
             <a:r>
-              <a:rPr lang="en-US" sz="600" dirty="0">
+              <a:rPr lang="en-US" sz="700" dirty="0">
                 <a:solidFill>
                   <a:srgbClr val="000000"/>
                 </a:solidFill>
@@ -6632,7 +6497,7 @@
               </a:rPr>
               <a:t>': 'ES'},</a:t>
             </a:r>
-            <a:endParaRPr lang="es-MX" sz="600" dirty="0">
+            <a:endParaRPr lang="es-MX" sz="700" dirty="0">
               <a:effectLst/>
               <a:latin typeface="Consolas" panose="020B0609020204030204" pitchFamily="49" charset="0"/>
               <a:ea typeface="Calibri" panose="020F0502020204030204" pitchFamily="34" charset="0"/>
@@ -6649,7 +6514,7 @@
               </a:spcAft>
             </a:pPr>
             <a:r>
-              <a:rPr lang="en-US" sz="600" dirty="0">
+              <a:rPr lang="en-US" sz="700" dirty="0">
                 <a:solidFill>
                   <a:srgbClr val="000000"/>
                 </a:solidFill>
@@ -6660,7 +6525,7 @@
               </a:rPr>
               <a:t>  {'id': 77,</a:t>
             </a:r>
-            <a:endParaRPr lang="es-MX" sz="600" dirty="0">
+            <a:endParaRPr lang="es-MX" sz="700" dirty="0">
               <a:effectLst/>
               <a:latin typeface="Consolas" panose="020B0609020204030204" pitchFamily="49" charset="0"/>
               <a:ea typeface="Calibri" panose="020F0502020204030204" pitchFamily="34" charset="0"/>
@@ -6677,7 +6542,7 @@
               </a:spcAft>
             </a:pPr>
             <a:r>
-              <a:rPr lang="en-US" sz="600" dirty="0">
+              <a:rPr lang="en-US" sz="700" dirty="0">
                 <a:solidFill>
                   <a:srgbClr val="000000"/>
                 </a:solidFill>
@@ -6689,7 +6554,7 @@
               <a:t>   '</a:t>
             </a:r>
             <a:r>
-              <a:rPr lang="en-US" sz="600" dirty="0" err="1">
+              <a:rPr lang="en-US" sz="700" dirty="0" err="1">
                 <a:solidFill>
                   <a:srgbClr val="000000"/>
                 </a:solidFill>
@@ -6701,7 +6566,7 @@
               <a:t>logo_path</a:t>
             </a:r>
             <a:r>
-              <a:rPr lang="en-US" sz="600" dirty="0">
+              <a:rPr lang="en-US" sz="700" dirty="0">
                 <a:solidFill>
                   <a:srgbClr val="000000"/>
                 </a:solidFill>
@@ -6712,7 +6577,7 @@
               </a:rPr>
               <a:t>': None,</a:t>
             </a:r>
-            <a:endParaRPr lang="es-MX" sz="600" dirty="0">
+            <a:endParaRPr lang="es-MX" sz="700" dirty="0">
               <a:effectLst/>
               <a:latin typeface="Consolas" panose="020B0609020204030204" pitchFamily="49" charset="0"/>
               <a:ea typeface="Calibri" panose="020F0502020204030204" pitchFamily="34" charset="0"/>
@@ -6729,7 +6594,7 @@
               </a:spcAft>
             </a:pPr>
             <a:r>
-              <a:rPr lang="en-US" sz="600" dirty="0">
+              <a:rPr lang="en-US" sz="700" dirty="0">
                 <a:solidFill>
                   <a:srgbClr val="000000"/>
                 </a:solidFill>
@@ -6740,7 +6605,7 @@
               </a:rPr>
               <a:t>   'name': 'Milestone Productions',</a:t>
             </a:r>
-            <a:endParaRPr lang="es-MX" sz="600" dirty="0">
+            <a:endParaRPr lang="es-MX" sz="700" dirty="0">
               <a:effectLst/>
               <a:latin typeface="Consolas" panose="020B0609020204030204" pitchFamily="49" charset="0"/>
               <a:ea typeface="Calibri" panose="020F0502020204030204" pitchFamily="34" charset="0"/>
@@ -6757,7 +6622,7 @@
               </a:spcAft>
             </a:pPr>
             <a:r>
-              <a:rPr lang="en-US" sz="600" dirty="0">
+              <a:rPr lang="en-US" sz="700" dirty="0">
                 <a:solidFill>
                   <a:srgbClr val="000000"/>
                 </a:solidFill>
@@ -6769,7 +6634,7 @@
               <a:t>   '</a:t>
             </a:r>
             <a:r>
-              <a:rPr lang="en-US" sz="600" dirty="0" err="1">
+              <a:rPr lang="en-US" sz="700" dirty="0" err="1">
                 <a:solidFill>
                   <a:srgbClr val="000000"/>
                 </a:solidFill>
@@ -6781,7 +6646,7 @@
               <a:t>origin_country</a:t>
             </a:r>
             <a:r>
-              <a:rPr lang="en-US" sz="600" dirty="0">
+              <a:rPr lang="en-US" sz="700" dirty="0">
                 <a:solidFill>
                   <a:srgbClr val="000000"/>
                 </a:solidFill>
@@ -6792,7 +6657,7 @@
               </a:rPr>
               <a:t>': ''}],</a:t>
             </a:r>
-            <a:endParaRPr lang="es-MX" sz="600" dirty="0">
+            <a:endParaRPr lang="es-MX" sz="700" dirty="0">
               <a:effectLst/>
               <a:latin typeface="Consolas" panose="020B0609020204030204" pitchFamily="49" charset="0"/>
               <a:ea typeface="Calibri" panose="020F0502020204030204" pitchFamily="34" charset="0"/>
@@ -6809,7 +6674,7 @@
               </a:spcAft>
             </a:pPr>
             <a:r>
-              <a:rPr lang="en-US" sz="600" dirty="0">
+              <a:rPr lang="en-US" sz="700" dirty="0">
                 <a:solidFill>
                   <a:srgbClr val="000000"/>
                 </a:solidFill>
@@ -6821,7 +6686,7 @@
               <a:t> '</a:t>
             </a:r>
             <a:r>
-              <a:rPr lang="en-US" sz="600" dirty="0" err="1">
+              <a:rPr lang="en-US" sz="700" dirty="0" err="1">
                 <a:solidFill>
                   <a:srgbClr val="000000"/>
                 </a:solidFill>
@@ -6833,7 +6698,7 @@
               <a:t>production_countries</a:t>
             </a:r>
             <a:r>
-              <a:rPr lang="en-US" sz="600" dirty="0">
+              <a:rPr lang="en-US" sz="700" dirty="0">
                 <a:solidFill>
                   <a:srgbClr val="000000"/>
                 </a:solidFill>
@@ -6844,7 +6709,7 @@
               </a:rPr>
               <a:t>': [{'iso_3166_1': 'CA', 'name': 'Canada'},</a:t>
             </a:r>
-            <a:endParaRPr lang="es-MX" sz="600" dirty="0">
+            <a:endParaRPr lang="es-MX" sz="700" dirty="0">
               <a:effectLst/>
               <a:latin typeface="Consolas" panose="020B0609020204030204" pitchFamily="49" charset="0"/>
               <a:ea typeface="Calibri" panose="020F0502020204030204" pitchFamily="34" charset="0"/>
@@ -6861,7 +6726,7 @@
               </a:spcAft>
             </a:pPr>
             <a:r>
-              <a:rPr lang="en-US" sz="600" dirty="0">
+              <a:rPr lang="en-US" sz="700" dirty="0">
                 <a:solidFill>
                   <a:srgbClr val="000000"/>
                 </a:solidFill>
@@ -6872,7 +6737,7 @@
               </a:rPr>
               <a:t>  {'iso_3166_1': 'ES', 'name': 'Spain'}],</a:t>
             </a:r>
-            <a:endParaRPr lang="es-MX" sz="600" dirty="0">
+            <a:endParaRPr lang="es-MX" sz="700" dirty="0">
               <a:effectLst/>
               <a:latin typeface="Consolas" panose="020B0609020204030204" pitchFamily="49" charset="0"/>
               <a:ea typeface="Calibri" panose="020F0502020204030204" pitchFamily="34" charset="0"/>
@@ -6889,7 +6754,7 @@
               </a:spcAft>
             </a:pPr>
             <a:r>
-              <a:rPr lang="en-US" sz="600" dirty="0">
+              <a:rPr lang="en-US" sz="700" dirty="0">
                 <a:solidFill>
                   <a:srgbClr val="000000"/>
                 </a:solidFill>
@@ -6901,7 +6766,7 @@
               <a:t> '</a:t>
             </a:r>
             <a:r>
-              <a:rPr lang="en-US" sz="600" dirty="0" err="1">
+              <a:rPr lang="en-US" sz="700" dirty="0" err="1">
                 <a:solidFill>
                   <a:srgbClr val="000000"/>
                 </a:solidFill>
@@ -6913,7 +6778,7 @@
               <a:t>release_date</a:t>
             </a:r>
             <a:r>
-              <a:rPr lang="en-US" sz="600" dirty="0">
+              <a:rPr lang="en-US" sz="700" dirty="0">
                 <a:solidFill>
                   <a:srgbClr val="000000"/>
                 </a:solidFill>
@@ -6924,7 +6789,7 @@
               </a:rPr>
               <a:t>': '2003-03-07',</a:t>
             </a:r>
-            <a:endParaRPr lang="es-MX" sz="600" dirty="0">
+            <a:endParaRPr lang="es-MX" sz="700" dirty="0">
               <a:effectLst/>
               <a:latin typeface="Consolas" panose="020B0609020204030204" pitchFamily="49" charset="0"/>
               <a:ea typeface="Calibri" panose="020F0502020204030204" pitchFamily="34" charset="0"/>
@@ -6941,7 +6806,7 @@
               </a:spcAft>
             </a:pPr>
             <a:r>
-              <a:rPr lang="en-US" sz="600" dirty="0">
+              <a:rPr lang="en-US" sz="700" dirty="0">
                 <a:solidFill>
                   <a:srgbClr val="000000"/>
                 </a:solidFill>
@@ -6952,7 +6817,7 @@
               </a:rPr>
               <a:t> 'revenue': 12300000,</a:t>
             </a:r>
-            <a:endParaRPr lang="es-MX" sz="600" dirty="0">
+            <a:endParaRPr lang="es-MX" sz="700" dirty="0">
               <a:effectLst/>
               <a:latin typeface="Consolas" panose="020B0609020204030204" pitchFamily="49" charset="0"/>
               <a:ea typeface="Calibri" panose="020F0502020204030204" pitchFamily="34" charset="0"/>
@@ -6969,7 +6834,7 @@
               </a:spcAft>
             </a:pPr>
             <a:r>
-              <a:rPr lang="en-US" sz="600" dirty="0">
+              <a:rPr lang="en-US" sz="700" dirty="0">
                 <a:solidFill>
                   <a:srgbClr val="000000"/>
                 </a:solidFill>
@@ -6980,7 +6845,7 @@
               </a:rPr>
               <a:t> 'runtime': 106,</a:t>
             </a:r>
-            <a:endParaRPr lang="es-MX" sz="600" dirty="0">
+            <a:endParaRPr lang="es-MX" sz="700" dirty="0">
               <a:effectLst/>
               <a:latin typeface="Consolas" panose="020B0609020204030204" pitchFamily="49" charset="0"/>
               <a:ea typeface="Calibri" panose="020F0502020204030204" pitchFamily="34" charset="0"/>
@@ -6997,7 +6862,7 @@
               </a:spcAft>
             </a:pPr>
             <a:r>
-              <a:rPr lang="en-US" sz="600" dirty="0">
+              <a:rPr lang="en-US" sz="700" dirty="0">
                 <a:solidFill>
                   <a:srgbClr val="000000"/>
                 </a:solidFill>
@@ -7009,7 +6874,7 @@
               <a:t> '</a:t>
             </a:r>
             <a:r>
-              <a:rPr lang="en-US" sz="600" dirty="0" err="1">
+              <a:rPr lang="en-US" sz="700" dirty="0" err="1">
                 <a:solidFill>
                   <a:srgbClr val="000000"/>
                 </a:solidFill>
@@ -7021,7 +6886,7 @@
               <a:t>spoken_languages</a:t>
             </a:r>
             <a:r>
-              <a:rPr lang="en-US" sz="600" dirty="0">
+              <a:rPr lang="en-US" sz="700" dirty="0">
                 <a:solidFill>
                   <a:srgbClr val="000000"/>
                 </a:solidFill>
@@ -7033,7 +6898,7 @@
               <a:t>': [{'</a:t>
             </a:r>
             <a:r>
-              <a:rPr lang="en-US" sz="600" dirty="0" err="1">
+              <a:rPr lang="en-US" sz="700" dirty="0" err="1">
                 <a:solidFill>
                   <a:srgbClr val="000000"/>
                 </a:solidFill>
@@ -7045,7 +6910,7 @@
               <a:t>english_name</a:t>
             </a:r>
             <a:r>
-              <a:rPr lang="en-US" sz="600" dirty="0">
+              <a:rPr lang="en-US" sz="700" dirty="0">
                 <a:solidFill>
                   <a:srgbClr val="000000"/>
                 </a:solidFill>
@@ -7056,7 +6921,7 @@
               </a:rPr>
               <a:t>': 'English',</a:t>
             </a:r>
-            <a:endParaRPr lang="es-MX" sz="600" dirty="0">
+            <a:endParaRPr lang="es-MX" sz="700" dirty="0">
               <a:effectLst/>
               <a:latin typeface="Consolas" panose="020B0609020204030204" pitchFamily="49" charset="0"/>
               <a:ea typeface="Calibri" panose="020F0502020204030204" pitchFamily="34" charset="0"/>
@@ -7073,7 +6938,7 @@
               </a:spcAft>
             </a:pPr>
             <a:r>
-              <a:rPr lang="en-US" sz="600" dirty="0">
+              <a:rPr lang="en-US" sz="700" dirty="0">
                 <a:solidFill>
                   <a:srgbClr val="000000"/>
                 </a:solidFill>
@@ -7085,7 +6950,7 @@
               <a:t>   'iso_639_1': '</a:t>
             </a:r>
             <a:r>
-              <a:rPr lang="en-US" sz="600" dirty="0" err="1">
+              <a:rPr lang="en-US" sz="700" dirty="0" err="1">
                 <a:solidFill>
                   <a:srgbClr val="000000"/>
                 </a:solidFill>
@@ -7097,7 +6962,7 @@
               <a:t>en</a:t>
             </a:r>
             <a:r>
-              <a:rPr lang="en-US" sz="600" dirty="0">
+              <a:rPr lang="en-US" sz="700" dirty="0">
                 <a:solidFill>
                   <a:srgbClr val="000000"/>
                 </a:solidFill>
@@ -7108,7 +6973,7 @@
               </a:rPr>
               <a:t>',</a:t>
             </a:r>
-            <a:endParaRPr lang="es-MX" sz="600" dirty="0">
+            <a:endParaRPr lang="es-MX" sz="700" dirty="0">
               <a:effectLst/>
               <a:latin typeface="Consolas" panose="020B0609020204030204" pitchFamily="49" charset="0"/>
               <a:ea typeface="Calibri" panose="020F0502020204030204" pitchFamily="34" charset="0"/>
@@ -7125,7 +6990,7 @@
               </a:spcAft>
             </a:pPr>
             <a:r>
-              <a:rPr lang="en-US" sz="600" dirty="0">
+              <a:rPr lang="en-US" sz="700" dirty="0">
                 <a:solidFill>
                   <a:srgbClr val="000000"/>
                 </a:solidFill>
@@ -7136,7 +7001,7 @@
               </a:rPr>
               <a:t>   'name': 'English'}],</a:t>
             </a:r>
-            <a:endParaRPr lang="es-MX" sz="600" dirty="0">
+            <a:endParaRPr lang="es-MX" sz="700" dirty="0">
               <a:effectLst/>
               <a:latin typeface="Consolas" panose="020B0609020204030204" pitchFamily="49" charset="0"/>
               <a:ea typeface="Calibri" panose="020F0502020204030204" pitchFamily="34" charset="0"/>
@@ -7153,7 +7018,7 @@
               </a:spcAft>
             </a:pPr>
             <a:r>
-              <a:rPr lang="en-US" sz="600" dirty="0">
+              <a:rPr lang="en-US" sz="700" dirty="0">
                 <a:solidFill>
                   <a:srgbClr val="000000"/>
                 </a:solidFill>
@@ -7164,7 +7029,7 @@
               </a:rPr>
               <a:t> 'status': 'Released',</a:t>
             </a:r>
-            <a:endParaRPr lang="es-MX" sz="600" dirty="0">
+            <a:endParaRPr lang="es-MX" sz="700" dirty="0">
               <a:effectLst/>
               <a:latin typeface="Consolas" panose="020B0609020204030204" pitchFamily="49" charset="0"/>
               <a:ea typeface="Calibri" panose="020F0502020204030204" pitchFamily="34" charset="0"/>
@@ -7181,7 +7046,7 @@
               </a:spcAft>
             </a:pPr>
             <a:r>
-              <a:rPr lang="en-US" sz="600" dirty="0">
+              <a:rPr lang="en-US" sz="700" dirty="0">
                 <a:solidFill>
                   <a:srgbClr val="000000"/>
                 </a:solidFill>
@@ -7192,7 +7057,7 @@
               </a:rPr>
               <a:t> 'tagline': '',</a:t>
             </a:r>
-            <a:endParaRPr lang="es-MX" sz="600" dirty="0">
+            <a:endParaRPr lang="es-MX" sz="700" dirty="0">
               <a:effectLst/>
               <a:latin typeface="Consolas" panose="020B0609020204030204" pitchFamily="49" charset="0"/>
               <a:ea typeface="Calibri" panose="020F0502020204030204" pitchFamily="34" charset="0"/>
@@ -7209,7 +7074,7 @@
               </a:spcAft>
             </a:pPr>
             <a:r>
-              <a:rPr lang="en-US" sz="600" dirty="0">
+              <a:rPr lang="en-US" sz="700" dirty="0">
                 <a:solidFill>
                   <a:srgbClr val="000000"/>
                 </a:solidFill>
@@ -7220,7 +7085,7 @@
               </a:rPr>
               <a:t> 'title': 'My Life Without Me',</a:t>
             </a:r>
-            <a:endParaRPr lang="es-MX" sz="600" dirty="0">
+            <a:endParaRPr lang="es-MX" sz="700" dirty="0">
               <a:effectLst/>
               <a:latin typeface="Consolas" panose="020B0609020204030204" pitchFamily="49" charset="0"/>
               <a:ea typeface="Calibri" panose="020F0502020204030204" pitchFamily="34" charset="0"/>
@@ -7237,7 +7102,7 @@
               </a:spcAft>
             </a:pPr>
             <a:r>
-              <a:rPr lang="en-US" sz="600" dirty="0">
+              <a:rPr lang="en-US" sz="700" dirty="0">
                 <a:solidFill>
                   <a:srgbClr val="000000"/>
                 </a:solidFill>
@@ -7248,7 +7113,7 @@
               </a:rPr>
               <a:t> 'video': False,</a:t>
             </a:r>
-            <a:endParaRPr lang="es-MX" sz="600" dirty="0">
+            <a:endParaRPr lang="es-MX" sz="700" dirty="0">
               <a:effectLst/>
               <a:latin typeface="Consolas" panose="020B0609020204030204" pitchFamily="49" charset="0"/>
               <a:ea typeface="Calibri" panose="020F0502020204030204" pitchFamily="34" charset="0"/>
@@ -7265,7 +7130,7 @@
               </a:spcAft>
             </a:pPr>
             <a:r>
-              <a:rPr lang="en-US" sz="600" dirty="0">
+              <a:rPr lang="en-US" sz="700" dirty="0">
                 <a:solidFill>
                   <a:srgbClr val="000000"/>
                 </a:solidFill>
@@ -7277,7 +7142,7 @@
               <a:t> '</a:t>
             </a:r>
             <a:r>
-              <a:rPr lang="en-US" sz="600" dirty="0" err="1">
+              <a:rPr lang="en-US" sz="700" dirty="0" err="1">
                 <a:solidFill>
                   <a:srgbClr val="000000"/>
                 </a:solidFill>
@@ -7289,7 +7154,7 @@
               <a:t>vote_average</a:t>
             </a:r>
             <a:r>
-              <a:rPr lang="en-US" sz="600" dirty="0">
+              <a:rPr lang="en-US" sz="700" dirty="0">
                 <a:solidFill>
                   <a:srgbClr val="000000"/>
                 </a:solidFill>
@@ -7300,7 +7165,7 @@
               </a:rPr>
               <a:t>': 5.8,</a:t>
             </a:r>
-            <a:endParaRPr lang="es-MX" sz="600" dirty="0">
+            <a:endParaRPr lang="es-MX" sz="700" dirty="0">
               <a:effectLst/>
               <a:latin typeface="Consolas" panose="020B0609020204030204" pitchFamily="49" charset="0"/>
               <a:ea typeface="Calibri" panose="020F0502020204030204" pitchFamily="34" charset="0"/>
@@ -7317,7 +7182,7 @@
               </a:spcAft>
             </a:pPr>
             <a:r>
-              <a:rPr lang="en-US" sz="600" dirty="0">
+              <a:rPr lang="en-US" sz="700" dirty="0">
                 <a:solidFill>
                   <a:srgbClr val="000000"/>
                 </a:solidFill>
@@ -7329,7 +7194,7 @@
               <a:t> '</a:t>
             </a:r>
             <a:r>
-              <a:rPr lang="en-US" sz="600" dirty="0" err="1">
+              <a:rPr lang="en-US" sz="700" dirty="0" err="1">
                 <a:solidFill>
                   <a:srgbClr val="000000"/>
                 </a:solidFill>
@@ -7341,7 +7206,7 @@
               <a:t>vote_count</a:t>
             </a:r>
             <a:r>
-              <a:rPr lang="en-US" sz="600" dirty="0">
+              <a:rPr lang="en-US" sz="700" dirty="0">
                 <a:solidFill>
                   <a:srgbClr val="000000"/>
                 </a:solidFill>
@@ -7352,7 +7217,7 @@
               </a:rPr>
               <a:t>': 364}</a:t>
             </a:r>
-            <a:endParaRPr lang="es-MX" sz="600" dirty="0">
+            <a:endParaRPr lang="es-MX" sz="700" dirty="0">
               <a:effectLst/>
               <a:latin typeface="Consolas" panose="020B0609020204030204" pitchFamily="49" charset="0"/>
               <a:ea typeface="Calibri" panose="020F0502020204030204" pitchFamily="34" charset="0"/>
@@ -7376,7 +7241,7 @@
           <p:nvPr/>
         </p:nvPicPr>
         <p:blipFill>
-          <a:blip r:embed="rId4">
+          <a:blip r:embed="rId3">
             <a:extLst>
               <a:ext uri="{28A0092B-C50C-407E-A947-70E740481C1C}">
                 <a14:useLocalDpi xmlns:a14="http://schemas.microsoft.com/office/drawing/2010/main" val="0"/>
@@ -7421,7 +7286,7 @@
 </p:sld>
 </file>
 
-<file path=ppt/slides/slide6.xml><?xml version="1.0" encoding="utf-8"?>
+<file path=ppt/slides/slide5.xml><?xml version="1.0" encoding="utf-8"?>
 <p:sld xmlns:a="http://schemas.openxmlformats.org/drawingml/2006/main" xmlns:r="http://schemas.openxmlformats.org/officeDocument/2006/relationships" xmlns:p="http://schemas.openxmlformats.org/presentationml/2006/main">
   <p:cSld>
     <p:spTree>
@@ -7903,7 +7768,7 @@
 </p:sld>
 </file>
 
-<file path=ppt/slides/slide7.xml><?xml version="1.0" encoding="utf-8"?>
+<file path=ppt/slides/slide6.xml><?xml version="1.0" encoding="utf-8"?>
 <p:sld xmlns:a="http://schemas.openxmlformats.org/drawingml/2006/main" xmlns:r="http://schemas.openxmlformats.org/officeDocument/2006/relationships" xmlns:p="http://schemas.openxmlformats.org/presentationml/2006/main">
   <p:cSld>
     <p:spTree>
@@ -8089,7 +7954,7 @@
 </p:sld>
 </file>
 
-<file path=ppt/slides/slide8.xml><?xml version="1.0" encoding="utf-8"?>
+<file path=ppt/slides/slide7.xml><?xml version="1.0" encoding="utf-8"?>
 <p:sld xmlns:a="http://schemas.openxmlformats.org/drawingml/2006/main" xmlns:r="http://schemas.openxmlformats.org/officeDocument/2006/relationships" xmlns:p="http://schemas.openxmlformats.org/presentationml/2006/main">
   <p:cSld>
     <p:spTree>
@@ -27652,7 +27517,7 @@
 </p:sld>
 </file>
 
-<file path=ppt/slides/slide9.xml><?xml version="1.0" encoding="utf-8"?>
+<file path=ppt/slides/slide8.xml><?xml version="1.0" encoding="utf-8"?>
 <p:sld xmlns:a="http://schemas.openxmlformats.org/drawingml/2006/main" xmlns:r="http://schemas.openxmlformats.org/officeDocument/2006/relationships" xmlns:p="http://schemas.openxmlformats.org/presentationml/2006/main">
   <p:cSld>
     <p:spTree>
@@ -27731,6 +27596,89 @@
     <p:extLst>
       <p:ext uri="{BB962C8B-B14F-4D97-AF65-F5344CB8AC3E}">
         <p14:creationId xmlns:p14="http://schemas.microsoft.com/office/powerpoint/2010/main" val="3856243705"/>
+      </p:ext>
+    </p:extLst>
+  </p:cSld>
+  <p:clrMapOvr>
+    <a:masterClrMapping/>
+  </p:clrMapOvr>
+</p:sld>
+</file>
+
+<file path=ppt/slides/slide9.xml><?xml version="1.0" encoding="utf-8"?>
+<p:sld xmlns:a="http://schemas.openxmlformats.org/drawingml/2006/main" xmlns:r="http://schemas.openxmlformats.org/officeDocument/2006/relationships" xmlns:p="http://schemas.openxmlformats.org/presentationml/2006/main">
+  <p:cSld>
+    <p:spTree>
+      <p:nvGrpSpPr>
+        <p:cNvPr id="1" name=""/>
+        <p:cNvGrpSpPr/>
+        <p:nvPr/>
+      </p:nvGrpSpPr>
+      <p:grpSpPr>
+        <a:xfrm>
+          <a:off x="0" y="0"/>
+          <a:ext cx="0" cy="0"/>
+          <a:chOff x="0" y="0"/>
+          <a:chExt cx="0" cy="0"/>
+        </a:xfrm>
+      </p:grpSpPr>
+      <p:sp>
+        <p:nvSpPr>
+          <p:cNvPr id="2" name="Title 1">
+            <a:extLst>
+              <a:ext uri="{FF2B5EF4-FFF2-40B4-BE49-F238E27FC236}">
+                <a16:creationId xmlns:a16="http://schemas.microsoft.com/office/drawing/2014/main" id="{0052B24A-D7F2-4D2B-B78F-F9F6CD1A447F}"/>
+              </a:ext>
+            </a:extLst>
+          </p:cNvPr>
+          <p:cNvSpPr>
+            <a:spLocks noGrp="1"/>
+          </p:cNvSpPr>
+          <p:nvPr>
+            <p:ph type="title"/>
+          </p:nvPr>
+        </p:nvSpPr>
+        <p:spPr/>
+        <p:txBody>
+          <a:bodyPr/>
+          <a:lstStyle/>
+          <a:p>
+            <a:r>
+              <a:rPr lang="es-MX" dirty="0"/>
+              <a:t>Preprocesado de datos</a:t>
+            </a:r>
+          </a:p>
+        </p:txBody>
+      </p:sp>
+      <p:sp>
+        <p:nvSpPr>
+          <p:cNvPr id="3" name="Content Placeholder 2">
+            <a:extLst>
+              <a:ext uri="{FF2B5EF4-FFF2-40B4-BE49-F238E27FC236}">
+                <a16:creationId xmlns:a16="http://schemas.microsoft.com/office/drawing/2014/main" id="{0DF705A0-8091-48A4-BD6D-B1E2344D2DCE}"/>
+              </a:ext>
+            </a:extLst>
+          </p:cNvPr>
+          <p:cNvSpPr>
+            <a:spLocks noGrp="1"/>
+          </p:cNvSpPr>
+          <p:nvPr>
+            <p:ph idx="1"/>
+          </p:nvPr>
+        </p:nvSpPr>
+        <p:spPr/>
+        <p:txBody>
+          <a:bodyPr/>
+          <a:lstStyle/>
+          <a:p>
+            <a:endParaRPr lang="es-MX"/>
+          </a:p>
+        </p:txBody>
+      </p:sp>
+    </p:spTree>
+    <p:extLst>
+      <p:ext uri="{BB962C8B-B14F-4D97-AF65-F5344CB8AC3E}">
+        <p14:creationId xmlns:p14="http://schemas.microsoft.com/office/powerpoint/2010/main" val="3619597841"/>
       </p:ext>
     </p:extLst>
   </p:cSld>

</xml_diff>